<commit_message>
prezka + teoria finish
</commit_message>
<xml_diff>
--- a/BAIIM.pptx
+++ b/BAIIM.pptx
@@ -13,7 +13,7 @@
     <p:sldId id="257" r:id="rId4"/>
     <p:sldId id="273" r:id="rId5"/>
     <p:sldId id="271" r:id="rId6"/>
-    <p:sldId id="274" r:id="rId7"/>
+    <p:sldId id="275" r:id="rId7"/>
     <p:sldId id="260" r:id="rId8"/>
     <p:sldId id="259" r:id="rId9"/>
     <p:sldId id="264" r:id="rId10"/>
@@ -793,6 +793,10 @@
           <a:bodyPr/>
           <a:lstStyle/>
           <a:p>
+            <a:r>
+              <a:rPr lang="pl-PL" dirty="0" err="1"/>
+              <a:t>zagrozenia</a:t>
+            </a:r>
             <a:endParaRPr lang="pl-PL" dirty="0"/>
           </a:p>
         </p:txBody>
@@ -854,23 +858,6 @@
           <a:bodyPr/>
           <a:lstStyle/>
           <a:p>
-            <a:pPr marL="0" marR="0" lvl="0" indent="0" algn="l" defTabSz="914400" rtl="0" eaLnBrk="0" fontAlgn="base" latinLnBrk="0" hangingPunct="0">
-              <a:lnSpc>
-                <a:spcPct val="100000"/>
-              </a:lnSpc>
-              <a:spcBef>
-                <a:spcPct val="0"/>
-              </a:spcBef>
-              <a:spcAft>
-                <a:spcPct val="0"/>
-              </a:spcAft>
-              <a:buClrTx/>
-              <a:buSzTx/>
-              <a:buFontTx/>
-              <a:buNone/>
-              <a:tabLst/>
-              <a:defRPr/>
-            </a:pPr>
             <a:r>
               <a:rPr lang="pl-PL" dirty="0"/>
               <a:t>Jak </a:t>
@@ -879,9 +866,6 @@
               <a:rPr lang="pl-PL" dirty="0" err="1"/>
               <a:t>włączyc</a:t>
             </a:r>
-            <a:endParaRPr lang="pl-PL" dirty="0"/>
-          </a:p>
-          <a:p>
             <a:endParaRPr lang="pl-PL" dirty="0"/>
           </a:p>
         </p:txBody>
@@ -889,7 +873,7 @@
     </p:spTree>
     <p:extLst>
       <p:ext uri="{BB962C8B-B14F-4D97-AF65-F5344CB8AC3E}">
-        <p14:creationId xmlns:p14="http://schemas.microsoft.com/office/powerpoint/2010/main" val="541541051"/>
+        <p14:creationId xmlns:p14="http://schemas.microsoft.com/office/powerpoint/2010/main" val="1129111090"/>
       </p:ext>
     </p:extLst>
   </p:cSld>
@@ -1368,7 +1352,7 @@
               <a:pPr>
                 <a:defRPr/>
               </a:pPr>
-              <a:t>12/30/2022</a:t>
+              <a:t>12/31/2022</a:t>
             </a:fld>
             <a:endParaRPr lang="en-US"/>
           </a:p>
@@ -1578,7 +1562,7 @@
               <a:pPr>
                 <a:defRPr/>
               </a:pPr>
-              <a:t>12/30/2022</a:t>
+              <a:t>12/31/2022</a:t>
             </a:fld>
             <a:endParaRPr lang="en-US"/>
           </a:p>
@@ -1798,7 +1782,7 @@
               <a:pPr>
                 <a:defRPr/>
               </a:pPr>
-              <a:t>12/30/2022</a:t>
+              <a:t>12/31/2022</a:t>
             </a:fld>
             <a:endParaRPr lang="en-US"/>
           </a:p>
@@ -2030,7 +2014,7 @@
               <a:pPr>
                 <a:defRPr/>
               </a:pPr>
-              <a:t>12/30/2022</a:t>
+              <a:t>12/31/2022</a:t>
             </a:fld>
             <a:endParaRPr lang="en-US"/>
           </a:p>
@@ -2240,7 +2224,7 @@
               <a:pPr>
                 <a:defRPr/>
               </a:pPr>
-              <a:t>12/30/2022</a:t>
+              <a:t>12/31/2022</a:t>
             </a:fld>
             <a:endParaRPr lang="en-US"/>
           </a:p>
@@ -2526,7 +2510,7 @@
               <a:pPr>
                 <a:defRPr/>
               </a:pPr>
-              <a:t>12/30/2022</a:t>
+              <a:t>12/31/2022</a:t>
             </a:fld>
             <a:endParaRPr lang="en-US"/>
           </a:p>
@@ -2798,7 +2782,7 @@
               <a:pPr>
                 <a:defRPr/>
               </a:pPr>
-              <a:t>12/30/2022</a:t>
+              <a:t>12/31/2022</a:t>
             </a:fld>
             <a:endParaRPr lang="en-US"/>
           </a:p>
@@ -3205,7 +3189,7 @@
               <a:pPr>
                 <a:defRPr/>
               </a:pPr>
-              <a:t>12/30/2022</a:t>
+              <a:t>12/31/2022</a:t>
             </a:fld>
             <a:endParaRPr lang="en-US"/>
           </a:p>
@@ -3363,7 +3347,7 @@
               <a:pPr>
                 <a:defRPr/>
               </a:pPr>
-              <a:t>12/30/2022</a:t>
+              <a:t>12/31/2022</a:t>
             </a:fld>
             <a:endParaRPr lang="en-US"/>
           </a:p>
@@ -3498,7 +3482,7 @@
               <a:pPr>
                 <a:defRPr/>
               </a:pPr>
-              <a:t>12/30/2022</a:t>
+              <a:t>12/31/2022</a:t>
             </a:fld>
             <a:endParaRPr lang="en-US"/>
           </a:p>
@@ -3815,7 +3799,7 @@
               <a:pPr>
                 <a:defRPr/>
               </a:pPr>
-              <a:t>12/30/2022</a:t>
+              <a:t>12/31/2022</a:t>
             </a:fld>
             <a:endParaRPr lang="en-US"/>
           </a:p>
@@ -4025,7 +4009,7 @@
               <a:pPr>
                 <a:defRPr/>
               </a:pPr>
-              <a:t>12/30/2022</a:t>
+              <a:t>12/31/2022</a:t>
             </a:fld>
             <a:endParaRPr lang="en-US"/>
           </a:p>
@@ -4323,7 +4307,7 @@
               <a:pPr>
                 <a:defRPr/>
               </a:pPr>
-              <a:t>12/30/2022</a:t>
+              <a:t>12/31/2022</a:t>
             </a:fld>
             <a:endParaRPr lang="en-US"/>
           </a:p>
@@ -4533,7 +4517,7 @@
               <a:pPr>
                 <a:defRPr/>
               </a:pPr>
-              <a:t>12/30/2022</a:t>
+              <a:t>12/31/2022</a:t>
             </a:fld>
             <a:endParaRPr lang="en-US"/>
           </a:p>
@@ -4753,7 +4737,7 @@
               <a:pPr>
                 <a:defRPr/>
               </a:pPr>
-              <a:t>12/30/2022</a:t>
+              <a:t>12/31/2022</a:t>
             </a:fld>
             <a:endParaRPr lang="en-US"/>
           </a:p>
@@ -5039,7 +5023,7 @@
               <a:pPr>
                 <a:defRPr/>
               </a:pPr>
-              <a:t>12/30/2022</a:t>
+              <a:t>12/31/2022</a:t>
             </a:fld>
             <a:endParaRPr lang="en-US"/>
           </a:p>
@@ -5311,7 +5295,7 @@
               <a:pPr>
                 <a:defRPr/>
               </a:pPr>
-              <a:t>12/30/2022</a:t>
+              <a:t>12/31/2022</a:t>
             </a:fld>
             <a:endParaRPr lang="en-US"/>
           </a:p>
@@ -5718,7 +5702,7 @@
               <a:pPr>
                 <a:defRPr/>
               </a:pPr>
-              <a:t>12/30/2022</a:t>
+              <a:t>12/31/2022</a:t>
             </a:fld>
             <a:endParaRPr lang="en-US"/>
           </a:p>
@@ -5876,7 +5860,7 @@
               <a:pPr>
                 <a:defRPr/>
               </a:pPr>
-              <a:t>12/30/2022</a:t>
+              <a:t>12/31/2022</a:t>
             </a:fld>
             <a:endParaRPr lang="en-US"/>
           </a:p>
@@ -6011,7 +5995,7 @@
               <a:pPr>
                 <a:defRPr/>
               </a:pPr>
-              <a:t>12/30/2022</a:t>
+              <a:t>12/31/2022</a:t>
             </a:fld>
             <a:endParaRPr lang="en-US"/>
           </a:p>
@@ -6328,7 +6312,7 @@
               <a:pPr>
                 <a:defRPr/>
               </a:pPr>
-              <a:t>12/30/2022</a:t>
+              <a:t>12/31/2022</a:t>
             </a:fld>
             <a:endParaRPr lang="en-US"/>
           </a:p>
@@ -6626,7 +6610,7 @@
               <a:pPr>
                 <a:defRPr/>
               </a:pPr>
-              <a:t>12/30/2022</a:t>
+              <a:t>12/31/2022</a:t>
             </a:fld>
             <a:endParaRPr lang="en-US"/>
           </a:p>
@@ -6894,7 +6878,7 @@
               <a:pPr>
                 <a:defRPr/>
               </a:pPr>
-              <a:t>12/30/2022</a:t>
+              <a:t>12/31/2022</a:t>
             </a:fld>
             <a:endParaRPr lang="en-US"/>
           </a:p>
@@ -7631,7 +7615,7 @@
               <a:pPr>
                 <a:defRPr/>
               </a:pPr>
-              <a:t>12/30/2022</a:t>
+              <a:t>12/31/2022</a:t>
             </a:fld>
             <a:endParaRPr lang="en-US"/>
           </a:p>
@@ -8230,7 +8214,7 @@
         </p:nvSpPr>
         <p:spPr bwMode="auto">
           <a:xfrm>
-            <a:off x="2214562" y="3778250"/>
+            <a:off x="2214563" y="3484659"/>
             <a:ext cx="5582269" cy="1200329"/>
           </a:xfrm>
           <a:prstGeom prst="rect">
@@ -8635,7 +8619,6 @@
   <p:clrMapOvr>
     <a:masterClrMapping/>
   </p:clrMapOvr>
-  <p:transition spd="med"/>
 </p:sld>
 </file>
 
@@ -8762,6 +8745,9 @@
   <p:clrMapOvr>
     <a:masterClrMapping/>
   </p:clrMapOvr>
+  <p:transition spd="slow">
+    <p:wipe/>
+  </p:transition>
 </p:sld>
 </file>
 
@@ -8842,42 +8828,6 @@
           </a:xfrm>
         </p:spPr>
       </p:pic>
-      <p:sp>
-        <p:nvSpPr>
-          <p:cNvPr id="4" name="pole tekstowe 3">
-            <a:extLst>
-              <a:ext uri="{FF2B5EF4-FFF2-40B4-BE49-F238E27FC236}">
-                <a16:creationId xmlns:a16="http://schemas.microsoft.com/office/drawing/2014/main" id="{EFBD0440-99AD-2D45-32B9-63FFB11CE576}"/>
-              </a:ext>
-            </a:extLst>
-          </p:cNvPr>
-          <p:cNvSpPr txBox="1"/>
-          <p:nvPr/>
-        </p:nvSpPr>
-        <p:spPr>
-          <a:xfrm>
-            <a:off x="0" y="-2262157"/>
-            <a:ext cx="0" cy="4524315"/>
-          </a:xfrm>
-          <a:prstGeom prst="rect">
-            <a:avLst/>
-          </a:prstGeom>
-          <a:noFill/>
-        </p:spPr>
-        <p:txBody>
-          <a:bodyPr wrap="square">
-            <a:spAutoFit/>
-          </a:bodyPr>
-          <a:lstStyle/>
-          <a:p>
-            <a:r>
-              <a:rPr lang="pl-PL"/>
-              <a:t>bibliografia</a:t>
-            </a:r>
-            <a:endParaRPr lang="pl-PL" dirty="0"/>
-          </a:p>
-        </p:txBody>
-      </p:sp>
     </p:spTree>
     <p:extLst>
       <p:ext uri="{BB962C8B-B14F-4D97-AF65-F5344CB8AC3E}">
@@ -8888,6 +8838,9 @@
   <p:clrMapOvr>
     <a:masterClrMapping/>
   </p:clrMapOvr>
+  <p:transition spd="slow">
+    <p:wipe/>
+  </p:transition>
 </p:sld>
 </file>
 
@@ -9047,6 +9000,9 @@
   <p:clrMapOvr>
     <a:masterClrMapping/>
   </p:clrMapOvr>
+  <p:transition spd="slow">
+    <p:wipe/>
+  </p:transition>
 </p:sld>
 </file>
 
@@ -9146,6 +9102,9 @@
   <p:clrMapOvr>
     <a:masterClrMapping/>
   </p:clrMapOvr>
+  <p:transition spd="slow">
+    <p:wipe/>
+  </p:transition>
 </p:sld>
 </file>
 
@@ -9388,7 +9347,9 @@
   <p:clrMapOvr>
     <a:masterClrMapping/>
   </p:clrMapOvr>
-  <p:transition spd="med"/>
+  <p:transition spd="slow">
+    <p:wipe/>
+  </p:transition>
 </p:sld>
 </file>
 
@@ -9878,6 +9839,9 @@
   <p:clrMapOvr>
     <a:masterClrMapping/>
   </p:clrMapOvr>
+  <p:transition spd="slow">
+    <p:wipe/>
+  </p:transition>
 </p:sld>
 </file>
 
@@ -10004,6 +9968,9 @@
   <p:clrMapOvr>
     <a:masterClrMapping/>
   </p:clrMapOvr>
+  <p:transition spd="slow">
+    <p:wipe/>
+  </p:transition>
 </p:sld>
 </file>
 
@@ -10029,7 +9996,7 @@
           <p:cNvPr id="2" name="Tytuł 1">
             <a:extLst>
               <a:ext uri="{FF2B5EF4-FFF2-40B4-BE49-F238E27FC236}">
-                <a16:creationId xmlns:a16="http://schemas.microsoft.com/office/drawing/2014/main" id="{00CC25AF-B6C1-0B1A-89E7-64979DF91757}"/>
+                <a16:creationId xmlns:a16="http://schemas.microsoft.com/office/drawing/2014/main" id="{BD6DD12D-D3CA-A931-F32D-78248ADD686B}"/>
               </a:ext>
             </a:extLst>
           </p:cNvPr>
@@ -10049,41 +10016,67 @@
           </a:p>
         </p:txBody>
       </p:sp>
-      <p:sp>
-        <p:nvSpPr>
-          <p:cNvPr id="3" name="Symbol zastępczy zawartości 2">
+      <p:pic>
+        <p:nvPicPr>
+          <p:cNvPr id="4" name="Picture 2" descr="Two factor authentication presentation mcit">
             <a:extLst>
               <a:ext uri="{FF2B5EF4-FFF2-40B4-BE49-F238E27FC236}">
-                <a16:creationId xmlns:a16="http://schemas.microsoft.com/office/drawing/2014/main" id="{93EA3654-CC9C-DD93-D7C7-F2C28D4F3746}"/>
+                <a16:creationId xmlns:a16="http://schemas.microsoft.com/office/drawing/2014/main" id="{B6E90EB3-AAE7-60B7-BC1D-216A12FE0EF8}"/>
               </a:ext>
             </a:extLst>
           </p:cNvPr>
-          <p:cNvSpPr>
-            <a:spLocks noGrp="1"/>
-          </p:cNvSpPr>
+          <p:cNvPicPr>
+            <a:picLocks noGrp="1" noChangeAspect="1" noChangeArrowheads="1"/>
+          </p:cNvPicPr>
           <p:nvPr>
             <p:ph idx="1"/>
           </p:nvPr>
-        </p:nvSpPr>
-        <p:spPr/>
-        <p:txBody>
-          <a:bodyPr/>
-          <a:lstStyle/>
-          <a:p>
-            <a:endParaRPr lang="pl-PL"/>
-          </a:p>
-        </p:txBody>
-      </p:sp>
+        </p:nvPicPr>
+        <p:blipFill>
+          <a:blip r:embed="rId3">
+            <a:extLst>
+              <a:ext uri="{28A0092B-C50C-407E-A947-70E740481C1C}">
+                <a14:useLocalDpi xmlns:a14="http://schemas.microsoft.com/office/drawing/2010/main" val="0"/>
+              </a:ext>
+            </a:extLst>
+          </a:blip>
+          <a:stretch>
+            <a:fillRect/>
+          </a:stretch>
+        </p:blipFill>
+        <p:spPr bwMode="auto">
+          <a:xfrm>
+            <a:off x="2900288" y="897930"/>
+            <a:ext cx="7085062" cy="5319349"/>
+          </a:xfrm>
+          <a:prstGeom prst="rect">
+            <a:avLst/>
+          </a:prstGeom>
+          <a:noFill/>
+          <a:extLst>
+            <a:ext uri="{909E8E84-426E-40DD-AFC4-6F175D3DCCD1}">
+              <a14:hiddenFill xmlns:a14="http://schemas.microsoft.com/office/drawing/2010/main">
+                <a:solidFill>
+                  <a:srgbClr val="FFFFFF"/>
+                </a:solidFill>
+              </a14:hiddenFill>
+            </a:ext>
+          </a:extLst>
+        </p:spPr>
+      </p:pic>
     </p:spTree>
     <p:extLst>
       <p:ext uri="{BB962C8B-B14F-4D97-AF65-F5344CB8AC3E}">
-        <p14:creationId xmlns:p14="http://schemas.microsoft.com/office/powerpoint/2010/main" val="2776248015"/>
+        <p14:creationId xmlns:p14="http://schemas.microsoft.com/office/powerpoint/2010/main" val="1683790132"/>
       </p:ext>
     </p:extLst>
   </p:cSld>
   <p:clrMapOvr>
     <a:masterClrMapping/>
   </p:clrMapOvr>
+  <p:transition spd="slow">
+    <p:wipe/>
+  </p:transition>
 </p:sld>
 </file>
 
@@ -10210,6 +10203,9 @@
   <p:clrMapOvr>
     <a:masterClrMapping/>
   </p:clrMapOvr>
+  <p:transition spd="slow">
+    <p:wipe/>
+  </p:transition>
 </p:sld>
 </file>
 
@@ -10336,6 +10332,9 @@
   <p:clrMapOvr>
     <a:masterClrMapping/>
   </p:clrMapOvr>
+  <p:transition spd="slow">
+    <p:wipe/>
+  </p:transition>
 </p:sld>
 </file>
 
@@ -10462,6 +10461,9 @@
   <p:clrMapOvr>
     <a:masterClrMapping/>
   </p:clrMapOvr>
+  <p:transition spd="slow">
+    <p:wipe/>
+  </p:transition>
 </p:sld>
 </file>
 
@@ -10588,6 +10590,9 @@
   <p:clrMapOvr>
     <a:masterClrMapping/>
   </p:clrMapOvr>
+  <p:transition spd="slow">
+    <p:wipe/>
+  </p:transition>
 </p:sld>
 </file>
 

</xml_diff>